<commit_message>
Fix lambda in presentation
</commit_message>
<xml_diff>
--- a/presentation/Kotlin Presentation.pptx
+++ b/presentation/Kotlin Presentation.pptx
@@ -287,6 +287,10 @@
 </p:cmAuthorLst>
 </file>
 
+<file path=ppt/revisionInfo.xml><?xml version="1.0" encoding="utf-8"?>
+<p1510:revInfo xmlns:a="http://schemas.openxmlformats.org/drawingml/2006/main" xmlns:r="http://schemas.openxmlformats.org/officeDocument/2006/relationships" xmlns:p1510="http://schemas.microsoft.com/office/powerpoint/2015/10/main"/>
+</file>
+
 <file path=ppt/comments/comment1.xml><?xml version="1.0" encoding="utf-8"?>
 <p:cmLst xmlns:a="http://schemas.openxmlformats.org/drawingml/2006/main" xmlns:r="http://schemas.openxmlformats.org/officeDocument/2006/relationships" xmlns:p="http://schemas.openxmlformats.org/presentationml/2006/main">
   <p:cm authorId="1" dt="2017-12-05T13:07:53.851" idx="1">
@@ -4477,8 +4481,8 @@
         </p:nvSpPr>
         <p:spPr>
           <a:xfrm>
-            <a:off x="1295650" y="754375"/>
-            <a:ext cx="5181850" cy="3771900"/>
+            <a:off x="1371600" y="754063"/>
+            <a:ext cx="5029200" cy="3771900"/>
           </a:xfrm>
           <a:custGeom>
             <a:avLst/>
@@ -29535,7 +29539,7 @@
                 <a:cs typeface="Verdana"/>
                 <a:sym typeface="Verdana"/>
               </a:rPr>
-              <a:t>sum3: </a:t>
+              <a:t>sum3 = </a:t>
             </a:r>
             <a:r>
               <a:rPr lang="en-GB" sz="2600" b="1" strike="noStrike" dirty="0">
@@ -29960,28 +29964,40 @@
               <a:t>val</a:t>
             </a:r>
             <a:r>
+              <a:rPr lang="en-GB" sz="2600" b="0" strike="noStrike">
+                <a:solidFill>
+                  <a:srgbClr val="CC7832"/>
+                </a:solidFill>
+                <a:latin typeface="Verdana"/>
+                <a:ea typeface="Verdana"/>
+                <a:cs typeface="Verdana"/>
+                <a:sym typeface="Verdana"/>
+              </a:rPr>
+              <a:t> </a:t>
+            </a:r>
+            <a:r>
+              <a:rPr lang="en-GB" sz="2600" b="0" strike="noStrike">
+                <a:solidFill>
+                  <a:srgbClr val="A9B7C6"/>
+                </a:solidFill>
+                <a:latin typeface="Verdana"/>
+                <a:ea typeface="Verdana"/>
+                <a:cs typeface="Verdana"/>
+                <a:sym typeface="Verdana"/>
+              </a:rPr>
+              <a:t>sum3 = </a:t>
+            </a:r>
+            <a:r>
               <a:rPr lang="en-GB" sz="2600" b="0" strike="noStrike" dirty="0">
                 <a:solidFill>
-                  <a:srgbClr val="CC7832"/>
-                </a:solidFill>
-                <a:latin typeface="Verdana"/>
-                <a:ea typeface="Verdana"/>
-                <a:cs typeface="Verdana"/>
-                <a:sym typeface="Verdana"/>
-              </a:rPr>
-              <a:t> </a:t>
-            </a:r>
-            <a:r>
-              <a:rPr lang="en-GB" sz="2600" b="0" strike="noStrike" dirty="0">
-                <a:solidFill>
-                  <a:srgbClr val="A9B7C6"/>
-                </a:solidFill>
-                <a:latin typeface="Verdana"/>
-                <a:ea typeface="Verdana"/>
-                <a:cs typeface="Verdana"/>
-                <a:sym typeface="Verdana"/>
-              </a:rPr>
-              <a:t>sum3: { x: </a:t>
+                  <a:srgbClr val="A9B7C6"/>
+                </a:solidFill>
+                <a:latin typeface="Verdana"/>
+                <a:ea typeface="Verdana"/>
+                <a:cs typeface="Verdana"/>
+                <a:sym typeface="Verdana"/>
+              </a:rPr>
+              <a:t>{ x: </a:t>
             </a:r>
             <a:r>
               <a:rPr lang="en-GB" sz="2600" b="0" strike="noStrike" dirty="0" err="1">

</xml_diff>